<commit_message>
Just chnaged notation to match the text
</commit_message>
<xml_diff>
--- a/StudentGuideModule1/newtons_laws/newtons_laws_fig4_new.pptx
+++ b/StudentGuideModule1/newtons_laws/newtons_laws_fig4_new.pptx
@@ -104,6 +104,22 @@
       </a:defRPr>
     </a:lvl9pPr>
   </p:defaultTextStyle>
+  <p:extLst>
+    <p:ext uri="{EFAFB233-063F-42B5-8137-9DF3F51BA10A}">
+      <p15:sldGuideLst xmlns:p15="http://schemas.microsoft.com/office/powerpoint/2012/main">
+        <p15:guide id="1" orient="horz" pos="2160">
+          <p15:clr>
+            <a:srgbClr val="A4A3A4"/>
+          </p15:clr>
+        </p15:guide>
+        <p15:guide id="2" pos="2880">
+          <p15:clr>
+            <a:srgbClr val="A4A3A4"/>
+          </p15:clr>
+        </p15:guide>
+      </p15:sldGuideLst>
+    </p:ext>
+  </p:extLst>
 </p:presentation>
 </file>
 
@@ -145,10 +161,9 @@
           <a:lstStyle/>
           <a:p>
             <a:r>
-              <a:rPr lang="en-US" smtClean="0"/>
+              <a:rPr lang="en-US"/>
               <a:t>Click to edit Master title style</a:t>
             </a:r>
-            <a:endParaRPr lang="en-US"/>
           </a:p>
         </p:txBody>
       </p:sp>
@@ -264,10 +279,9 @@
           </a:lstStyle>
           <a:p>
             <a:r>
-              <a:rPr lang="en-US" smtClean="0"/>
+              <a:rPr lang="en-US"/>
               <a:t>Click to edit Master subtitle style</a:t>
             </a:r>
-            <a:endParaRPr lang="en-US"/>
           </a:p>
         </p:txBody>
       </p:sp>
@@ -288,7 +302,7 @@
           <a:p>
             <a:fld id="{2B81A30E-FEA9-42C1-95AD-B75AE3EF8DCE}" type="datetimeFigureOut">
               <a:rPr lang="en-US" smtClean="0"/>
-              <a:t>5/9/2016</a:t>
+              <a:t>7/24/2019</a:t>
             </a:fld>
             <a:endParaRPr lang="en-US"/>
           </a:p>
@@ -382,10 +396,9 @@
           <a:lstStyle/>
           <a:p>
             <a:r>
-              <a:rPr lang="en-US" smtClean="0"/>
+              <a:rPr lang="en-US"/>
               <a:t>Click to edit Master title style</a:t>
             </a:r>
-            <a:endParaRPr lang="en-US"/>
           </a:p>
         </p:txBody>
       </p:sp>
@@ -406,38 +419,37 @@
           <a:p>
             <a:pPr lvl="0"/>
             <a:r>
-              <a:rPr lang="en-US" smtClean="0"/>
+              <a:rPr lang="en-US"/>
               <a:t>Click to edit Master text styles</a:t>
             </a:r>
           </a:p>
           <a:p>
             <a:pPr lvl="1"/>
             <a:r>
-              <a:rPr lang="en-US" smtClean="0"/>
+              <a:rPr lang="en-US"/>
               <a:t>Second level</a:t>
             </a:r>
           </a:p>
           <a:p>
             <a:pPr lvl="2"/>
             <a:r>
-              <a:rPr lang="en-US" smtClean="0"/>
+              <a:rPr lang="en-US"/>
               <a:t>Third level</a:t>
             </a:r>
           </a:p>
           <a:p>
             <a:pPr lvl="3"/>
             <a:r>
-              <a:rPr lang="en-US" smtClean="0"/>
+              <a:rPr lang="en-US"/>
               <a:t>Fourth level</a:t>
             </a:r>
           </a:p>
           <a:p>
             <a:pPr lvl="4"/>
             <a:r>
-              <a:rPr lang="en-US" smtClean="0"/>
+              <a:rPr lang="en-US"/>
               <a:t>Fifth level</a:t>
             </a:r>
-            <a:endParaRPr lang="en-US"/>
           </a:p>
         </p:txBody>
       </p:sp>
@@ -458,7 +470,7 @@
           <a:p>
             <a:fld id="{2B81A30E-FEA9-42C1-95AD-B75AE3EF8DCE}" type="datetimeFigureOut">
               <a:rPr lang="en-US" smtClean="0"/>
-              <a:t>5/9/2016</a:t>
+              <a:t>7/24/2019</a:t>
             </a:fld>
             <a:endParaRPr lang="en-US"/>
           </a:p>
@@ -557,10 +569,9 @@
           <a:lstStyle/>
           <a:p>
             <a:r>
-              <a:rPr lang="en-US" smtClean="0"/>
+              <a:rPr lang="en-US"/>
               <a:t>Click to edit Master title style</a:t>
             </a:r>
-            <a:endParaRPr lang="en-US"/>
           </a:p>
         </p:txBody>
       </p:sp>
@@ -586,38 +597,37 @@
           <a:p>
             <a:pPr lvl="0"/>
             <a:r>
-              <a:rPr lang="en-US" smtClean="0"/>
+              <a:rPr lang="en-US"/>
               <a:t>Click to edit Master text styles</a:t>
             </a:r>
           </a:p>
           <a:p>
             <a:pPr lvl="1"/>
             <a:r>
-              <a:rPr lang="en-US" smtClean="0"/>
+              <a:rPr lang="en-US"/>
               <a:t>Second level</a:t>
             </a:r>
           </a:p>
           <a:p>
             <a:pPr lvl="2"/>
             <a:r>
-              <a:rPr lang="en-US" smtClean="0"/>
+              <a:rPr lang="en-US"/>
               <a:t>Third level</a:t>
             </a:r>
           </a:p>
           <a:p>
             <a:pPr lvl="3"/>
             <a:r>
-              <a:rPr lang="en-US" smtClean="0"/>
+              <a:rPr lang="en-US"/>
               <a:t>Fourth level</a:t>
             </a:r>
           </a:p>
           <a:p>
             <a:pPr lvl="4"/>
             <a:r>
-              <a:rPr lang="en-US" smtClean="0"/>
+              <a:rPr lang="en-US"/>
               <a:t>Fifth level</a:t>
             </a:r>
-            <a:endParaRPr lang="en-US"/>
           </a:p>
         </p:txBody>
       </p:sp>
@@ -638,7 +648,7 @@
           <a:p>
             <a:fld id="{2B81A30E-FEA9-42C1-95AD-B75AE3EF8DCE}" type="datetimeFigureOut">
               <a:rPr lang="en-US" smtClean="0"/>
-              <a:t>5/9/2016</a:t>
+              <a:t>7/24/2019</a:t>
             </a:fld>
             <a:endParaRPr lang="en-US"/>
           </a:p>
@@ -732,10 +742,9 @@
           <a:lstStyle/>
           <a:p>
             <a:r>
-              <a:rPr lang="en-US" smtClean="0"/>
+              <a:rPr lang="en-US"/>
               <a:t>Click to edit Master title style</a:t>
             </a:r>
-            <a:endParaRPr lang="en-US"/>
           </a:p>
         </p:txBody>
       </p:sp>
@@ -756,38 +765,37 @@
           <a:p>
             <a:pPr lvl="0"/>
             <a:r>
-              <a:rPr lang="en-US" smtClean="0"/>
+              <a:rPr lang="en-US"/>
               <a:t>Click to edit Master text styles</a:t>
             </a:r>
           </a:p>
           <a:p>
             <a:pPr lvl="1"/>
             <a:r>
-              <a:rPr lang="en-US" smtClean="0"/>
+              <a:rPr lang="en-US"/>
               <a:t>Second level</a:t>
             </a:r>
           </a:p>
           <a:p>
             <a:pPr lvl="2"/>
             <a:r>
-              <a:rPr lang="en-US" smtClean="0"/>
+              <a:rPr lang="en-US"/>
               <a:t>Third level</a:t>
             </a:r>
           </a:p>
           <a:p>
             <a:pPr lvl="3"/>
             <a:r>
-              <a:rPr lang="en-US" smtClean="0"/>
+              <a:rPr lang="en-US"/>
               <a:t>Fourth level</a:t>
             </a:r>
           </a:p>
           <a:p>
             <a:pPr lvl="4"/>
             <a:r>
-              <a:rPr lang="en-US" smtClean="0"/>
+              <a:rPr lang="en-US"/>
               <a:t>Fifth level</a:t>
             </a:r>
-            <a:endParaRPr lang="en-US"/>
           </a:p>
         </p:txBody>
       </p:sp>
@@ -808,7 +816,7 @@
           <a:p>
             <a:fld id="{2B81A30E-FEA9-42C1-95AD-B75AE3EF8DCE}" type="datetimeFigureOut">
               <a:rPr lang="en-US" smtClean="0"/>
-              <a:t>5/9/2016</a:t>
+              <a:t>7/24/2019</a:t>
             </a:fld>
             <a:endParaRPr lang="en-US"/>
           </a:p>
@@ -911,10 +919,9 @@
           </a:lstStyle>
           <a:p>
             <a:r>
-              <a:rPr lang="en-US" smtClean="0"/>
+              <a:rPr lang="en-US"/>
               <a:t>Click to edit Master title style</a:t>
             </a:r>
-            <a:endParaRPr lang="en-US"/>
           </a:p>
         </p:txBody>
       </p:sp>
@@ -1031,7 +1038,7 @@
           <a:p>
             <a:pPr lvl="0"/>
             <a:r>
-              <a:rPr lang="en-US" smtClean="0"/>
+              <a:rPr lang="en-US"/>
               <a:t>Click to edit Master text styles</a:t>
             </a:r>
           </a:p>
@@ -1054,7 +1061,7 @@
           <a:p>
             <a:fld id="{2B81A30E-FEA9-42C1-95AD-B75AE3EF8DCE}" type="datetimeFigureOut">
               <a:rPr lang="en-US" smtClean="0"/>
-              <a:t>5/9/2016</a:t>
+              <a:t>7/24/2019</a:t>
             </a:fld>
             <a:endParaRPr lang="en-US"/>
           </a:p>
@@ -1148,10 +1155,9 @@
           <a:lstStyle/>
           <a:p>
             <a:r>
-              <a:rPr lang="en-US" smtClean="0"/>
+              <a:rPr lang="en-US"/>
               <a:t>Click to edit Master title style</a:t>
             </a:r>
-            <a:endParaRPr lang="en-US"/>
           </a:p>
         </p:txBody>
       </p:sp>
@@ -1205,38 +1211,37 @@
           <a:p>
             <a:pPr lvl="0"/>
             <a:r>
-              <a:rPr lang="en-US" smtClean="0"/>
+              <a:rPr lang="en-US"/>
               <a:t>Click to edit Master text styles</a:t>
             </a:r>
           </a:p>
           <a:p>
             <a:pPr lvl="1"/>
             <a:r>
-              <a:rPr lang="en-US" smtClean="0"/>
+              <a:rPr lang="en-US"/>
               <a:t>Second level</a:t>
             </a:r>
           </a:p>
           <a:p>
             <a:pPr lvl="2"/>
             <a:r>
-              <a:rPr lang="en-US" smtClean="0"/>
+              <a:rPr lang="en-US"/>
               <a:t>Third level</a:t>
             </a:r>
           </a:p>
           <a:p>
             <a:pPr lvl="3"/>
             <a:r>
-              <a:rPr lang="en-US" smtClean="0"/>
+              <a:rPr lang="en-US"/>
               <a:t>Fourth level</a:t>
             </a:r>
           </a:p>
           <a:p>
             <a:pPr lvl="4"/>
             <a:r>
-              <a:rPr lang="en-US" smtClean="0"/>
+              <a:rPr lang="en-US"/>
               <a:t>Fifth level</a:t>
             </a:r>
-            <a:endParaRPr lang="en-US"/>
           </a:p>
         </p:txBody>
       </p:sp>
@@ -1290,38 +1295,37 @@
           <a:p>
             <a:pPr lvl="0"/>
             <a:r>
-              <a:rPr lang="en-US" smtClean="0"/>
+              <a:rPr lang="en-US"/>
               <a:t>Click to edit Master text styles</a:t>
             </a:r>
           </a:p>
           <a:p>
             <a:pPr lvl="1"/>
             <a:r>
-              <a:rPr lang="en-US" smtClean="0"/>
+              <a:rPr lang="en-US"/>
               <a:t>Second level</a:t>
             </a:r>
           </a:p>
           <a:p>
             <a:pPr lvl="2"/>
             <a:r>
-              <a:rPr lang="en-US" smtClean="0"/>
+              <a:rPr lang="en-US"/>
               <a:t>Third level</a:t>
             </a:r>
           </a:p>
           <a:p>
             <a:pPr lvl="3"/>
             <a:r>
-              <a:rPr lang="en-US" smtClean="0"/>
+              <a:rPr lang="en-US"/>
               <a:t>Fourth level</a:t>
             </a:r>
           </a:p>
           <a:p>
             <a:pPr lvl="4"/>
             <a:r>
-              <a:rPr lang="en-US" smtClean="0"/>
+              <a:rPr lang="en-US"/>
               <a:t>Fifth level</a:t>
             </a:r>
-            <a:endParaRPr lang="en-US"/>
           </a:p>
         </p:txBody>
       </p:sp>
@@ -1342,7 +1346,7 @@
           <a:p>
             <a:fld id="{2B81A30E-FEA9-42C1-95AD-B75AE3EF8DCE}" type="datetimeFigureOut">
               <a:rPr lang="en-US" smtClean="0"/>
-              <a:t>5/9/2016</a:t>
+              <a:t>7/24/2019</a:t>
             </a:fld>
             <a:endParaRPr lang="en-US"/>
           </a:p>
@@ -1440,10 +1444,9 @@
           </a:lstStyle>
           <a:p>
             <a:r>
-              <a:rPr lang="en-US" smtClean="0"/>
+              <a:rPr lang="en-US"/>
               <a:t>Click to edit Master title style</a:t>
             </a:r>
-            <a:endParaRPr lang="en-US"/>
           </a:p>
         </p:txBody>
       </p:sp>
@@ -1506,7 +1509,7 @@
           <a:p>
             <a:pPr lvl="0"/>
             <a:r>
-              <a:rPr lang="en-US" smtClean="0"/>
+              <a:rPr lang="en-US"/>
               <a:t>Click to edit Master text styles</a:t>
             </a:r>
           </a:p>
@@ -1562,38 +1565,37 @@
           <a:p>
             <a:pPr lvl="0"/>
             <a:r>
-              <a:rPr lang="en-US" smtClean="0"/>
+              <a:rPr lang="en-US"/>
               <a:t>Click to edit Master text styles</a:t>
             </a:r>
           </a:p>
           <a:p>
             <a:pPr lvl="1"/>
             <a:r>
-              <a:rPr lang="en-US" smtClean="0"/>
+              <a:rPr lang="en-US"/>
               <a:t>Second level</a:t>
             </a:r>
           </a:p>
           <a:p>
             <a:pPr lvl="2"/>
             <a:r>
-              <a:rPr lang="en-US" smtClean="0"/>
+              <a:rPr lang="en-US"/>
               <a:t>Third level</a:t>
             </a:r>
           </a:p>
           <a:p>
             <a:pPr lvl="3"/>
             <a:r>
-              <a:rPr lang="en-US" smtClean="0"/>
+              <a:rPr lang="en-US"/>
               <a:t>Fourth level</a:t>
             </a:r>
           </a:p>
           <a:p>
             <a:pPr lvl="4"/>
             <a:r>
-              <a:rPr lang="en-US" smtClean="0"/>
+              <a:rPr lang="en-US"/>
               <a:t>Fifth level</a:t>
             </a:r>
-            <a:endParaRPr lang="en-US"/>
           </a:p>
         </p:txBody>
       </p:sp>
@@ -1656,7 +1658,7 @@
           <a:p>
             <a:pPr lvl="0"/>
             <a:r>
-              <a:rPr lang="en-US" smtClean="0"/>
+              <a:rPr lang="en-US"/>
               <a:t>Click to edit Master text styles</a:t>
             </a:r>
           </a:p>
@@ -1712,38 +1714,37 @@
           <a:p>
             <a:pPr lvl="0"/>
             <a:r>
-              <a:rPr lang="en-US" smtClean="0"/>
+              <a:rPr lang="en-US"/>
               <a:t>Click to edit Master text styles</a:t>
             </a:r>
           </a:p>
           <a:p>
             <a:pPr lvl="1"/>
             <a:r>
-              <a:rPr lang="en-US" smtClean="0"/>
+              <a:rPr lang="en-US"/>
               <a:t>Second level</a:t>
             </a:r>
           </a:p>
           <a:p>
             <a:pPr lvl="2"/>
             <a:r>
-              <a:rPr lang="en-US" smtClean="0"/>
+              <a:rPr lang="en-US"/>
               <a:t>Third level</a:t>
             </a:r>
           </a:p>
           <a:p>
             <a:pPr lvl="3"/>
             <a:r>
-              <a:rPr lang="en-US" smtClean="0"/>
+              <a:rPr lang="en-US"/>
               <a:t>Fourth level</a:t>
             </a:r>
           </a:p>
           <a:p>
             <a:pPr lvl="4"/>
             <a:r>
-              <a:rPr lang="en-US" smtClean="0"/>
+              <a:rPr lang="en-US"/>
               <a:t>Fifth level</a:t>
             </a:r>
-            <a:endParaRPr lang="en-US"/>
           </a:p>
         </p:txBody>
       </p:sp>
@@ -1764,7 +1765,7 @@
           <a:p>
             <a:fld id="{2B81A30E-FEA9-42C1-95AD-B75AE3EF8DCE}" type="datetimeFigureOut">
               <a:rPr lang="en-US" smtClean="0"/>
-              <a:t>5/9/2016</a:t>
+              <a:t>7/24/2019</a:t>
             </a:fld>
             <a:endParaRPr lang="en-US"/>
           </a:p>
@@ -1858,10 +1859,9 @@
           <a:lstStyle/>
           <a:p>
             <a:r>
-              <a:rPr lang="en-US" smtClean="0"/>
+              <a:rPr lang="en-US"/>
               <a:t>Click to edit Master title style</a:t>
             </a:r>
-            <a:endParaRPr lang="en-US"/>
           </a:p>
         </p:txBody>
       </p:sp>
@@ -1882,7 +1882,7 @@
           <a:p>
             <a:fld id="{2B81A30E-FEA9-42C1-95AD-B75AE3EF8DCE}" type="datetimeFigureOut">
               <a:rPr lang="en-US" smtClean="0"/>
-              <a:t>5/9/2016</a:t>
+              <a:t>7/24/2019</a:t>
             </a:fld>
             <a:endParaRPr lang="en-US"/>
           </a:p>
@@ -1977,7 +1977,7 @@
           <a:p>
             <a:fld id="{2B81A30E-FEA9-42C1-95AD-B75AE3EF8DCE}" type="datetimeFigureOut">
               <a:rPr lang="en-US" smtClean="0"/>
-              <a:t>5/9/2016</a:t>
+              <a:t>7/24/2019</a:t>
             </a:fld>
             <a:endParaRPr lang="en-US"/>
           </a:p>
@@ -2080,10 +2080,9 @@
           </a:lstStyle>
           <a:p>
             <a:r>
-              <a:rPr lang="en-US" smtClean="0"/>
+              <a:rPr lang="en-US"/>
               <a:t>Click to edit Master title style</a:t>
             </a:r>
-            <a:endParaRPr lang="en-US"/>
           </a:p>
         </p:txBody>
       </p:sp>
@@ -2137,38 +2136,37 @@
           <a:p>
             <a:pPr lvl="0"/>
             <a:r>
-              <a:rPr lang="en-US" smtClean="0"/>
+              <a:rPr lang="en-US"/>
               <a:t>Click to edit Master text styles</a:t>
             </a:r>
           </a:p>
           <a:p>
             <a:pPr lvl="1"/>
             <a:r>
-              <a:rPr lang="en-US" smtClean="0"/>
+              <a:rPr lang="en-US"/>
               <a:t>Second level</a:t>
             </a:r>
           </a:p>
           <a:p>
             <a:pPr lvl="2"/>
             <a:r>
-              <a:rPr lang="en-US" smtClean="0"/>
+              <a:rPr lang="en-US"/>
               <a:t>Third level</a:t>
             </a:r>
           </a:p>
           <a:p>
             <a:pPr lvl="3"/>
             <a:r>
-              <a:rPr lang="en-US" smtClean="0"/>
+              <a:rPr lang="en-US"/>
               <a:t>Fourth level</a:t>
             </a:r>
           </a:p>
           <a:p>
             <a:pPr lvl="4"/>
             <a:r>
-              <a:rPr lang="en-US" smtClean="0"/>
+              <a:rPr lang="en-US"/>
               <a:t>Fifth level</a:t>
             </a:r>
-            <a:endParaRPr lang="en-US"/>
           </a:p>
         </p:txBody>
       </p:sp>
@@ -2231,7 +2229,7 @@
           <a:p>
             <a:pPr lvl="0"/>
             <a:r>
-              <a:rPr lang="en-US" smtClean="0"/>
+              <a:rPr lang="en-US"/>
               <a:t>Click to edit Master text styles</a:t>
             </a:r>
           </a:p>
@@ -2254,7 +2252,7 @@
           <a:p>
             <a:fld id="{2B81A30E-FEA9-42C1-95AD-B75AE3EF8DCE}" type="datetimeFigureOut">
               <a:rPr lang="en-US" smtClean="0"/>
-              <a:t>5/9/2016</a:t>
+              <a:t>7/24/2019</a:t>
             </a:fld>
             <a:endParaRPr lang="en-US"/>
           </a:p>
@@ -2357,10 +2355,9 @@
           </a:lstStyle>
           <a:p>
             <a:r>
-              <a:rPr lang="en-US" smtClean="0"/>
+              <a:rPr lang="en-US"/>
               <a:t>Click to edit Master title style</a:t>
             </a:r>
-            <a:endParaRPr lang="en-US"/>
           </a:p>
         </p:txBody>
       </p:sp>
@@ -2484,7 +2481,7 @@
           <a:p>
             <a:pPr lvl="0"/>
             <a:r>
-              <a:rPr lang="en-US" smtClean="0"/>
+              <a:rPr lang="en-US"/>
               <a:t>Click to edit Master text styles</a:t>
             </a:r>
           </a:p>
@@ -2507,7 +2504,7 @@
           <a:p>
             <a:fld id="{2B81A30E-FEA9-42C1-95AD-B75AE3EF8DCE}" type="datetimeFigureOut">
               <a:rPr lang="en-US" smtClean="0"/>
-              <a:t>5/9/2016</a:t>
+              <a:t>7/24/2019</a:t>
             </a:fld>
             <a:endParaRPr lang="en-US"/>
           </a:p>
@@ -2616,10 +2613,9 @@
           <a:lstStyle/>
           <a:p>
             <a:r>
-              <a:rPr lang="en-US" smtClean="0"/>
+              <a:rPr lang="en-US"/>
               <a:t>Click to edit Master title style</a:t>
             </a:r>
-            <a:endParaRPr lang="en-US"/>
           </a:p>
         </p:txBody>
       </p:sp>
@@ -2650,38 +2646,37 @@
           <a:p>
             <a:pPr lvl="0"/>
             <a:r>
-              <a:rPr lang="en-US" smtClean="0"/>
+              <a:rPr lang="en-US"/>
               <a:t>Click to edit Master text styles</a:t>
             </a:r>
           </a:p>
           <a:p>
             <a:pPr lvl="1"/>
             <a:r>
-              <a:rPr lang="en-US" smtClean="0"/>
+              <a:rPr lang="en-US"/>
               <a:t>Second level</a:t>
             </a:r>
           </a:p>
           <a:p>
             <a:pPr lvl="2"/>
             <a:r>
-              <a:rPr lang="en-US" smtClean="0"/>
+              <a:rPr lang="en-US"/>
               <a:t>Third level</a:t>
             </a:r>
           </a:p>
           <a:p>
             <a:pPr lvl="3"/>
             <a:r>
-              <a:rPr lang="en-US" smtClean="0"/>
+              <a:rPr lang="en-US"/>
               <a:t>Fourth level</a:t>
             </a:r>
           </a:p>
           <a:p>
             <a:pPr lvl="4"/>
             <a:r>
-              <a:rPr lang="en-US" smtClean="0"/>
+              <a:rPr lang="en-US"/>
               <a:t>Fifth level</a:t>
             </a:r>
-            <a:endParaRPr lang="en-US"/>
           </a:p>
         </p:txBody>
       </p:sp>
@@ -2720,7 +2715,7 @@
           <a:p>
             <a:fld id="{2B81A30E-FEA9-42C1-95AD-B75AE3EF8DCE}" type="datetimeFigureOut">
               <a:rPr lang="en-US" smtClean="0"/>
-              <a:t>5/9/2016</a:t>
+              <a:t>7/24/2019</a:t>
             </a:fld>
             <a:endParaRPr lang="en-US"/>
           </a:p>
@@ -3144,7 +3139,7 @@
         </p:nvSpPr>
         <p:spPr>
           <a:xfrm>
-            <a:off x="2697480" y="3344942"/>
+            <a:off x="2697480" y="3385582"/>
             <a:ext cx="609599" cy="527923"/>
           </a:xfrm>
           <a:prstGeom prst="rect">
@@ -3165,7 +3160,7 @@
           <a:p>
             <a:pPr algn="ctr"/>
             <a:r>
-              <a:rPr lang="en-US" sz="5400" b="1" cap="none" spc="0" dirty="0" smtClean="0">
+              <a:rPr lang="en-US" sz="5400" b="1" cap="none" spc="0" dirty="0">
                 <a:ln w="17780" cmpd="sng">
                   <a:noFill/>
                   <a:prstDash val="solid"/>
@@ -3181,7 +3176,7 @@
           <a:p>
             <a:pPr algn="ctr"/>
             <a:r>
-              <a:rPr lang="en-US" sz="4800" b="1" dirty="0" smtClean="0">
+              <a:rPr lang="en-US" sz="4800" b="1" dirty="0">
                 <a:ln w="17780" cmpd="sng">
                   <a:noFill/>
                   <a:prstDash val="solid"/>
@@ -3197,7 +3192,7 @@
           <a:p>
             <a:pPr algn="ctr"/>
             <a:r>
-              <a:rPr lang="en-US" sz="4400" b="1" cap="none" spc="0" dirty="0" smtClean="0">
+              <a:rPr lang="en-US" sz="4400" b="1" cap="none" spc="0" dirty="0">
                 <a:ln w="17780" cmpd="sng">
                   <a:noFill/>
                   <a:prstDash val="solid"/>
@@ -3209,21 +3204,11 @@
               </a:rPr>
               <a:t>Corp</a:t>
             </a:r>
-            <a:endParaRPr lang="en-US" sz="4400" b="1" cap="none" spc="0" dirty="0">
-              <a:ln w="17780" cmpd="sng">
-                <a:noFill/>
-                <a:prstDash val="solid"/>
-                <a:miter lim="800000"/>
-              </a:ln>
-              <a:latin typeface="Comic Sans MS" panose="030F0702030302020204" pitchFamily="66" charset="0"/>
-              <a:ea typeface="Tahoma" panose="020B0604030504040204" pitchFamily="34" charset="0"/>
-              <a:cs typeface="Tahoma" panose="020B0604030504040204" pitchFamily="34" charset="0"/>
-            </a:endParaRPr>
-          </a:p>
-        </p:txBody>
-      </p:sp>
-      <mc:AlternateContent xmlns:mc="http://schemas.openxmlformats.org/markup-compatibility/2006" xmlns:a14="http://schemas.microsoft.com/office/drawing/2010/main">
-        <mc:Choice Requires="a14">
+          </a:p>
+        </p:txBody>
+      </p:sp>
+      <mc:AlternateContent xmlns:mc="http://schemas.openxmlformats.org/markup-compatibility/2006">
+        <mc:Choice xmlns:a14="http://schemas.microsoft.com/office/drawing/2010/main" Requires="a14">
           <p:sp>
             <p:nvSpPr>
               <p:cNvPr id="5" name="TextBox 4"/>
@@ -3232,8 +3217,8 @@
             </p:nvSpPr>
             <p:spPr>
               <a:xfrm>
-                <a:off x="3657600" y="3224331"/>
-                <a:ext cx="377314" cy="369332"/>
+                <a:off x="3622488" y="3152466"/>
+                <a:ext cx="609598" cy="338554"/>
               </a:xfrm>
               <a:prstGeom prst="rect">
                 <a:avLst/>
@@ -3256,21 +3241,40 @@
                       <m:jc m:val="centerGroup"/>
                     </m:oMathParaPr>
                     <m:oMath xmlns:m="http://schemas.openxmlformats.org/officeDocument/2006/math">
-                      <m:r>
-                        <a:rPr lang="en-US" b="1" i="1" smtClean="0">
-                          <a:latin typeface="Cambria Math"/>
-                        </a:rPr>
-                        <m:t>𝑴</m:t>
-                      </m:r>
+                      <m:sSub>
+                        <m:sSubPr>
+                          <m:ctrlPr>
+                            <a:rPr lang="en-US" sz="1600" b="1" i="1" smtClean="0">
+                              <a:latin typeface="Cambria Math" panose="02040503050406030204" pitchFamily="18" charset="0"/>
+                            </a:rPr>
+                          </m:ctrlPr>
+                        </m:sSubPr>
+                        <m:e>
+                          <m:r>
+                            <a:rPr lang="en-US" sz="1600" b="1" i="1" smtClean="0">
+                              <a:latin typeface="Cambria Math" panose="02040503050406030204" pitchFamily="18" charset="0"/>
+                            </a:rPr>
+                            <m:t>𝒎</m:t>
+                          </m:r>
+                        </m:e>
+                        <m:sub>
+                          <m:r>
+                            <a:rPr lang="en-US" sz="1600" b="1" i="1" smtClean="0">
+                              <a:latin typeface="Cambria Math" panose="02040503050406030204" pitchFamily="18" charset="0"/>
+                            </a:rPr>
+                            <m:t>𝟏</m:t>
+                          </m:r>
+                        </m:sub>
+                      </m:sSub>
                     </m:oMath>
                   </m:oMathPara>
                 </a14:m>
-                <a:endParaRPr lang="en-US" b="1" dirty="0"/>
+                <a:endParaRPr lang="en-US" sz="1600" b="1" dirty="0"/>
               </a:p>
             </p:txBody>
           </p:sp>
         </mc:Choice>
-        <mc:Fallback xmlns="">
+        <mc:Fallback>
           <p:sp>
             <p:nvSpPr>
               <p:cNvPr id="5" name="TextBox 4"/>
@@ -3281,104 +3285,14 @@
             </p:nvSpPr>
             <p:spPr>
               <a:xfrm>
-                <a:off x="3657600" y="3224331"/>
-                <a:ext cx="377314" cy="369332"/>
+                <a:off x="3622488" y="3152466"/>
+                <a:ext cx="609598" cy="338554"/>
               </a:xfrm>
               <a:prstGeom prst="rect">
                 <a:avLst/>
               </a:prstGeom>
-              <a:blipFill rotWithShape="1">
+              <a:blipFill>
                 <a:blip r:embed="rId3"/>
-                <a:stretch>
-                  <a:fillRect r="-1613"/>
-                </a:stretch>
-              </a:blipFill>
-              <a:ln w="12700">
-                <a:noFill/>
-              </a:ln>
-            </p:spPr>
-            <p:txBody>
-              <a:bodyPr/>
-              <a:lstStyle/>
-              <a:p>
-                <a:r>
-                  <a:rPr lang="en-US">
-                    <a:noFill/>
-                  </a:rPr>
-                  <a:t> </a:t>
-                </a:r>
-              </a:p>
-            </p:txBody>
-          </p:sp>
-        </mc:Fallback>
-      </mc:AlternateContent>
-      <mc:AlternateContent xmlns:mc="http://schemas.openxmlformats.org/markup-compatibility/2006" xmlns:a14="http://schemas.microsoft.com/office/drawing/2010/main">
-        <mc:Choice Requires="a14">
-          <p:sp>
-            <p:nvSpPr>
-              <p:cNvPr id="7" name="TextBox 6"/>
-              <p:cNvSpPr txBox="1"/>
-              <p:nvPr/>
-            </p:nvSpPr>
-            <p:spPr>
-              <a:xfrm>
-                <a:off x="5423535" y="3212901"/>
-                <a:ext cx="377314" cy="369332"/>
-              </a:xfrm>
-              <a:prstGeom prst="rect">
-                <a:avLst/>
-              </a:prstGeom>
-              <a:noFill/>
-              <a:ln w="12700">
-                <a:noFill/>
-              </a:ln>
-            </p:spPr>
-            <p:txBody>
-              <a:bodyPr wrap="square" rtlCol="0">
-                <a:spAutoFit/>
-              </a:bodyPr>
-              <a:lstStyle/>
-              <a:p>
-                <a:pPr/>
-                <a14:m>
-                  <m:oMathPara xmlns:m="http://schemas.openxmlformats.org/officeDocument/2006/math">
-                    <m:oMathParaPr>
-                      <m:jc m:val="centerGroup"/>
-                    </m:oMathParaPr>
-                    <m:oMath xmlns:m="http://schemas.openxmlformats.org/officeDocument/2006/math">
-                      <m:r>
-                        <a:rPr lang="en-US" b="1" i="1" smtClean="0">
-                          <a:latin typeface="Cambria Math"/>
-                        </a:rPr>
-                        <m:t>𝒎</m:t>
-                      </m:r>
-                    </m:oMath>
-                  </m:oMathPara>
-                </a14:m>
-                <a:endParaRPr lang="en-US" b="1" dirty="0"/>
-              </a:p>
-            </p:txBody>
-          </p:sp>
-        </mc:Choice>
-        <mc:Fallback xmlns="">
-          <p:sp>
-            <p:nvSpPr>
-              <p:cNvPr id="7" name="TextBox 6"/>
-              <p:cNvSpPr txBox="1">
-                <a:spLocks noRot="1" noChangeAspect="1" noMove="1" noResize="1" noEditPoints="1" noAdjustHandles="1" noChangeArrowheads="1" noChangeShapeType="1" noTextEdit="1"/>
-              </p:cNvSpPr>
-              <p:nvPr/>
-            </p:nvSpPr>
-            <p:spPr>
-              <a:xfrm>
-                <a:off x="5423535" y="3212901"/>
-                <a:ext cx="377314" cy="369332"/>
-              </a:xfrm>
-              <a:prstGeom prst="rect">
-                <a:avLst/>
-              </a:prstGeom>
-              <a:blipFill rotWithShape="1">
-                <a:blip r:embed="rId4"/>
                 <a:stretch>
                   <a:fillRect/>
                 </a:stretch>
@@ -3438,8 +3352,8 @@
           </a:fontRef>
         </p:style>
       </p:cxnSp>
-      <mc:AlternateContent xmlns:mc="http://schemas.openxmlformats.org/markup-compatibility/2006" xmlns:a14="http://schemas.microsoft.com/office/drawing/2010/main">
-        <mc:Choice Requires="a14">
+      <mc:AlternateContent xmlns:mc="http://schemas.openxmlformats.org/markup-compatibility/2006">
+        <mc:Choice xmlns:a14="http://schemas.microsoft.com/office/drawing/2010/main" Requires="a14">
           <p:sp>
             <p:nvSpPr>
               <p:cNvPr id="11" name="TextBox 10"/>
@@ -3448,7 +3362,7 @@
             </p:nvSpPr>
             <p:spPr>
               <a:xfrm>
-                <a:off x="4370070" y="2576194"/>
+                <a:off x="4322693" y="2621914"/>
                 <a:ext cx="415166" cy="369332"/>
               </a:xfrm>
               <a:prstGeom prst="rect">
@@ -3477,7 +3391,7 @@
                           <m:chr m:val="⃗"/>
                           <m:ctrlPr>
                             <a:rPr lang="en-US" b="0" i="1" smtClean="0">
-                              <a:latin typeface="Cambria Math"/>
+                              <a:latin typeface="Cambria Math" panose="02040503050406030204" pitchFamily="18" charset="0"/>
                             </a:rPr>
                           </m:ctrlPr>
                         </m:accPr>
@@ -3498,7 +3412,7 @@
             </p:txBody>
           </p:sp>
         </mc:Choice>
-        <mc:Fallback xmlns="">
+        <mc:Fallback>
           <p:sp>
             <p:nvSpPr>
               <p:cNvPr id="11" name="TextBox 10"/>
@@ -3509,16 +3423,16 @@
             </p:nvSpPr>
             <p:spPr>
               <a:xfrm>
-                <a:off x="4370070" y="2576194"/>
+                <a:off x="4322693" y="2621914"/>
                 <a:ext cx="415166" cy="369332"/>
               </a:xfrm>
               <a:prstGeom prst="rect">
                 <a:avLst/>
               </a:prstGeom>
-              <a:blipFill rotWithShape="1">
-                <a:blip r:embed="rId5"/>
+              <a:blipFill>
+                <a:blip r:embed="rId4"/>
                 <a:stretch>
-                  <a:fillRect t="-23333" r="-29412"/>
+                  <a:fillRect t="-22951" r="-30882"/>
                 </a:stretch>
               </a:blipFill>
               <a:ln w="12700">
@@ -3585,7 +3499,7 @@
                           <m:chr m:val="⃗"/>
                           <m:ctrlPr>
                             <a:rPr lang="en-US" b="0" i="1" smtClean="0">
-                              <a:latin typeface="Cambria Math"/>
+                              <a:latin typeface="Cambria Math" panose="02040503050406030204" pitchFamily="18" charset="0"/>
                             </a:rPr>
                           </m:ctrlPr>
                         </m:accPr>
@@ -3692,8 +3606,8 @@
         </p:nvSpPr>
         <p:spPr>
           <a:xfrm>
-            <a:off x="3002279" y="2388388"/>
-            <a:ext cx="1032635" cy="307777"/>
+            <a:off x="2635659" y="2395070"/>
+            <a:ext cx="1032635" cy="338554"/>
           </a:xfrm>
           <a:prstGeom prst="rect">
             <a:avLst/>
@@ -3710,10 +3624,9 @@
           <a:lstStyle/>
           <a:p>
             <a:r>
-              <a:rPr lang="en-US" sz="1400" dirty="0" smtClean="0"/>
+              <a:rPr lang="en-US" sz="1600" dirty="0"/>
               <a:t>object 1</a:t>
             </a:r>
-            <a:endParaRPr lang="en-US" sz="1400" dirty="0"/>
           </a:p>
         </p:txBody>
       </p:sp>
@@ -3725,8 +3638,8 @@
         </p:nvSpPr>
         <p:spPr>
           <a:xfrm>
-            <a:off x="5316855" y="2386568"/>
-            <a:ext cx="1032635" cy="307777"/>
+            <a:off x="5629118" y="2775804"/>
+            <a:ext cx="1032635" cy="338554"/>
           </a:xfrm>
           <a:prstGeom prst="rect">
             <a:avLst/>
@@ -3743,13 +3656,133 @@
           <a:lstStyle/>
           <a:p>
             <a:r>
-              <a:rPr lang="en-US" sz="1400" dirty="0" smtClean="0"/>
+              <a:rPr lang="en-US" sz="1600" dirty="0"/>
               <a:t>object 2</a:t>
             </a:r>
-            <a:endParaRPr lang="en-US" sz="1400" dirty="0"/>
-          </a:p>
-        </p:txBody>
-      </p:sp>
+          </a:p>
+        </p:txBody>
+      </p:sp>
+      <mc:AlternateContent xmlns:mc="http://schemas.openxmlformats.org/markup-compatibility/2006">
+        <mc:Choice xmlns:a14="http://schemas.microsoft.com/office/drawing/2010/main" Requires="a14">
+          <p:sp>
+            <p:nvSpPr>
+              <p:cNvPr id="16" name="TextBox 15">
+                <a:extLst>
+                  <a:ext uri="{FF2B5EF4-FFF2-40B4-BE49-F238E27FC236}">
+                    <a16:creationId xmlns:a16="http://schemas.microsoft.com/office/drawing/2014/main" id="{1FF5F735-B90C-42B8-99AD-E29E6E227DBA}"/>
+                  </a:ext>
+                </a:extLst>
+              </p:cNvPr>
+              <p:cNvSpPr txBox="1"/>
+              <p:nvPr/>
+            </p:nvSpPr>
+            <p:spPr>
+              <a:xfrm>
+                <a:off x="5296535" y="3203257"/>
+                <a:ext cx="609598" cy="338554"/>
+              </a:xfrm>
+              <a:prstGeom prst="rect">
+                <a:avLst/>
+              </a:prstGeom>
+              <a:noFill/>
+              <a:ln w="12700">
+                <a:noFill/>
+              </a:ln>
+            </p:spPr>
+            <p:txBody>
+              <a:bodyPr wrap="square" rtlCol="0">
+                <a:spAutoFit/>
+              </a:bodyPr>
+              <a:lstStyle/>
+              <a:p>
+                <a:pPr/>
+                <a14:m>
+                  <m:oMathPara xmlns:m="http://schemas.openxmlformats.org/officeDocument/2006/math">
+                    <m:oMathParaPr>
+                      <m:jc m:val="centerGroup"/>
+                    </m:oMathParaPr>
+                    <m:oMath xmlns:m="http://schemas.openxmlformats.org/officeDocument/2006/math">
+                      <m:sSub>
+                        <m:sSubPr>
+                          <m:ctrlPr>
+                            <a:rPr lang="en-US" sz="1600" b="1" i="1" smtClean="0">
+                              <a:latin typeface="Cambria Math" panose="02040503050406030204" pitchFamily="18" charset="0"/>
+                            </a:rPr>
+                          </m:ctrlPr>
+                        </m:sSubPr>
+                        <m:e>
+                          <m:r>
+                            <a:rPr lang="en-US" sz="1600" b="1" i="1" smtClean="0">
+                              <a:latin typeface="Cambria Math" panose="02040503050406030204" pitchFamily="18" charset="0"/>
+                            </a:rPr>
+                            <m:t>𝒎</m:t>
+                          </m:r>
+                        </m:e>
+                        <m:sub>
+                          <m:r>
+                            <a:rPr lang="en-US" sz="1600" b="1" i="1" smtClean="0">
+                              <a:latin typeface="Cambria Math" panose="02040503050406030204" pitchFamily="18" charset="0"/>
+                            </a:rPr>
+                            <m:t>𝟐</m:t>
+                          </m:r>
+                        </m:sub>
+                      </m:sSub>
+                    </m:oMath>
+                  </m:oMathPara>
+                </a14:m>
+                <a:endParaRPr lang="en-US" sz="1600" b="1" dirty="0"/>
+              </a:p>
+            </p:txBody>
+          </p:sp>
+        </mc:Choice>
+        <mc:Fallback>
+          <p:sp>
+            <p:nvSpPr>
+              <p:cNvPr id="16" name="TextBox 15">
+                <a:extLst>
+                  <a:ext uri="{FF2B5EF4-FFF2-40B4-BE49-F238E27FC236}">
+                    <a16:creationId xmlns:a16="http://schemas.microsoft.com/office/drawing/2014/main" id="{1FF5F735-B90C-42B8-99AD-E29E6E227DBA}"/>
+                  </a:ext>
+                </a:extLst>
+              </p:cNvPr>
+              <p:cNvSpPr txBox="1">
+                <a:spLocks noRot="1" noChangeAspect="1" noMove="1" noResize="1" noEditPoints="1" noAdjustHandles="1" noChangeArrowheads="1" noChangeShapeType="1" noTextEdit="1"/>
+              </p:cNvSpPr>
+              <p:nvPr/>
+            </p:nvSpPr>
+            <p:spPr>
+              <a:xfrm>
+                <a:off x="5296535" y="3203257"/>
+                <a:ext cx="609598" cy="338554"/>
+              </a:xfrm>
+              <a:prstGeom prst="rect">
+                <a:avLst/>
+              </a:prstGeom>
+              <a:blipFill>
+                <a:blip r:embed="rId7"/>
+                <a:stretch>
+                  <a:fillRect/>
+                </a:stretch>
+              </a:blipFill>
+              <a:ln w="12700">
+                <a:noFill/>
+              </a:ln>
+            </p:spPr>
+            <p:txBody>
+              <a:bodyPr/>
+              <a:lstStyle/>
+              <a:p>
+                <a:r>
+                  <a:rPr lang="en-US">
+                    <a:noFill/>
+                  </a:rPr>
+                  <a:t> </a:t>
+                </a:r>
+              </a:p>
+            </p:txBody>
+          </p:sp>
+        </mc:Fallback>
+      </mc:AlternateContent>
     </p:spTree>
     <p:extLst>
       <p:ext uri="{BB962C8B-B14F-4D97-AF65-F5344CB8AC3E}">

</xml_diff>

<commit_message>
Fixed figure 4 in newtons_laws
This is complicated.  I think Mariama had earlier tweaked the pptx file, but also provided a non-tweaked .eps file that was actually possibly corrupted (large, and crashed some pdf viewers).  This version implements the tweaked notation, but in an eps that was created the same as all others in this manual.  Should be okay now.
</commit_message>
<xml_diff>
--- a/StudentGuideModule1/newtons_laws/newtons_laws_fig4_new.pptx
+++ b/StudentGuideModule1/newtons_laws/newtons_laws_fig4_new.pptx
@@ -302,7 +302,7 @@
           <a:p>
             <a:fld id="{2B81A30E-FEA9-42C1-95AD-B75AE3EF8DCE}" type="datetimeFigureOut">
               <a:rPr lang="en-US" smtClean="0"/>
-              <a:t>7/24/2019</a:t>
+              <a:t>8/1/2019</a:t>
             </a:fld>
             <a:endParaRPr lang="en-US"/>
           </a:p>
@@ -470,7 +470,7 @@
           <a:p>
             <a:fld id="{2B81A30E-FEA9-42C1-95AD-B75AE3EF8DCE}" type="datetimeFigureOut">
               <a:rPr lang="en-US" smtClean="0"/>
-              <a:t>7/24/2019</a:t>
+              <a:t>8/1/2019</a:t>
             </a:fld>
             <a:endParaRPr lang="en-US"/>
           </a:p>
@@ -648,7 +648,7 @@
           <a:p>
             <a:fld id="{2B81A30E-FEA9-42C1-95AD-B75AE3EF8DCE}" type="datetimeFigureOut">
               <a:rPr lang="en-US" smtClean="0"/>
-              <a:t>7/24/2019</a:t>
+              <a:t>8/1/2019</a:t>
             </a:fld>
             <a:endParaRPr lang="en-US"/>
           </a:p>
@@ -816,7 +816,7 @@
           <a:p>
             <a:fld id="{2B81A30E-FEA9-42C1-95AD-B75AE3EF8DCE}" type="datetimeFigureOut">
               <a:rPr lang="en-US" smtClean="0"/>
-              <a:t>7/24/2019</a:t>
+              <a:t>8/1/2019</a:t>
             </a:fld>
             <a:endParaRPr lang="en-US"/>
           </a:p>
@@ -1061,7 +1061,7 @@
           <a:p>
             <a:fld id="{2B81A30E-FEA9-42C1-95AD-B75AE3EF8DCE}" type="datetimeFigureOut">
               <a:rPr lang="en-US" smtClean="0"/>
-              <a:t>7/24/2019</a:t>
+              <a:t>8/1/2019</a:t>
             </a:fld>
             <a:endParaRPr lang="en-US"/>
           </a:p>
@@ -1346,7 +1346,7 @@
           <a:p>
             <a:fld id="{2B81A30E-FEA9-42C1-95AD-B75AE3EF8DCE}" type="datetimeFigureOut">
               <a:rPr lang="en-US" smtClean="0"/>
-              <a:t>7/24/2019</a:t>
+              <a:t>8/1/2019</a:t>
             </a:fld>
             <a:endParaRPr lang="en-US"/>
           </a:p>
@@ -1765,7 +1765,7 @@
           <a:p>
             <a:fld id="{2B81A30E-FEA9-42C1-95AD-B75AE3EF8DCE}" type="datetimeFigureOut">
               <a:rPr lang="en-US" smtClean="0"/>
-              <a:t>7/24/2019</a:t>
+              <a:t>8/1/2019</a:t>
             </a:fld>
             <a:endParaRPr lang="en-US"/>
           </a:p>
@@ -1882,7 +1882,7 @@
           <a:p>
             <a:fld id="{2B81A30E-FEA9-42C1-95AD-B75AE3EF8DCE}" type="datetimeFigureOut">
               <a:rPr lang="en-US" smtClean="0"/>
-              <a:t>7/24/2019</a:t>
+              <a:t>8/1/2019</a:t>
             </a:fld>
             <a:endParaRPr lang="en-US"/>
           </a:p>
@@ -1977,7 +1977,7 @@
           <a:p>
             <a:fld id="{2B81A30E-FEA9-42C1-95AD-B75AE3EF8DCE}" type="datetimeFigureOut">
               <a:rPr lang="en-US" smtClean="0"/>
-              <a:t>7/24/2019</a:t>
+              <a:t>8/1/2019</a:t>
             </a:fld>
             <a:endParaRPr lang="en-US"/>
           </a:p>
@@ -2252,7 +2252,7 @@
           <a:p>
             <a:fld id="{2B81A30E-FEA9-42C1-95AD-B75AE3EF8DCE}" type="datetimeFigureOut">
               <a:rPr lang="en-US" smtClean="0"/>
-              <a:t>7/24/2019</a:t>
+              <a:t>8/1/2019</a:t>
             </a:fld>
             <a:endParaRPr lang="en-US"/>
           </a:p>
@@ -2504,7 +2504,7 @@
           <a:p>
             <a:fld id="{2B81A30E-FEA9-42C1-95AD-B75AE3EF8DCE}" type="datetimeFigureOut">
               <a:rPr lang="en-US" smtClean="0"/>
-              <a:t>7/24/2019</a:t>
+              <a:t>8/1/2019</a:t>
             </a:fld>
             <a:endParaRPr lang="en-US"/>
           </a:p>
@@ -2715,7 +2715,7 @@
           <a:p>
             <a:fld id="{2B81A30E-FEA9-42C1-95AD-B75AE3EF8DCE}" type="datetimeFigureOut">
               <a:rPr lang="en-US" smtClean="0"/>
-              <a:t>7/24/2019</a:t>
+              <a:t>8/1/2019</a:t>
             </a:fld>
             <a:endParaRPr lang="en-US"/>
           </a:p>
@@ -3207,8 +3207,8 @@
           </a:p>
         </p:txBody>
       </p:sp>
-      <mc:AlternateContent xmlns:mc="http://schemas.openxmlformats.org/markup-compatibility/2006">
-        <mc:Choice xmlns:a14="http://schemas.microsoft.com/office/drawing/2010/main" Requires="a14">
+      <mc:AlternateContent xmlns:mc="http://schemas.openxmlformats.org/markup-compatibility/2006" xmlns:a14="http://schemas.microsoft.com/office/drawing/2010/main">
+        <mc:Choice Requires="a14">
           <p:sp>
             <p:nvSpPr>
               <p:cNvPr id="5" name="TextBox 4"/>
@@ -3274,7 +3274,7 @@
             </p:txBody>
           </p:sp>
         </mc:Choice>
-        <mc:Fallback>
+        <mc:Fallback xmlns="">
           <p:sp>
             <p:nvSpPr>
               <p:cNvPr id="5" name="TextBox 4"/>
@@ -3352,8 +3352,8 @@
           </a:fontRef>
         </p:style>
       </p:cxnSp>
-      <mc:AlternateContent xmlns:mc="http://schemas.openxmlformats.org/markup-compatibility/2006">
-        <mc:Choice xmlns:a14="http://schemas.microsoft.com/office/drawing/2010/main" Requires="a14">
+      <mc:AlternateContent xmlns:mc="http://schemas.openxmlformats.org/markup-compatibility/2006" xmlns:a14="http://schemas.microsoft.com/office/drawing/2010/main">
+        <mc:Choice Requires="a14">
           <p:sp>
             <p:nvSpPr>
               <p:cNvPr id="11" name="TextBox 10"/>
@@ -3412,7 +3412,7 @@
             </p:txBody>
           </p:sp>
         </mc:Choice>
-        <mc:Fallback>
+        <mc:Fallback xmlns="">
           <p:sp>
             <p:nvSpPr>
               <p:cNvPr id="11" name="TextBox 10"/>
@@ -3678,7 +3678,7 @@
             </p:nvSpPr>
             <p:spPr>
               <a:xfrm>
-                <a:off x="5296535" y="3203257"/>
+                <a:off x="5296535" y="3212222"/>
                 <a:ext cx="609598" cy="338554"/>
               </a:xfrm>
               <a:prstGeom prst="rect">
@@ -3752,7 +3752,7 @@
             </p:nvSpPr>
             <p:spPr>
               <a:xfrm>
-                <a:off x="5296535" y="3203257"/>
+                <a:off x="5296535" y="3212222"/>
                 <a:ext cx="609598" cy="338554"/>
               </a:xfrm>
               <a:prstGeom prst="rect">

</xml_diff>